<commit_message>
update 2019 slides with code examples
also added pdf
</commit_message>
<xml_diff>
--- a/files/2019/LabVIEW_Advanced.pptx
+++ b/files/2019/LabVIEW_Advanced.pptx
@@ -5,7 +5,7 @@
     <p:sldMasterId id="2147483648" r:id="rId1"/>
   </p:sldMasterIdLst>
   <p:notesMasterIdLst>
-    <p:notesMasterId r:id="rId47"/>
+    <p:notesMasterId r:id="rId46"/>
   </p:notesMasterIdLst>
   <p:sldIdLst>
     <p:sldId id="256" r:id="rId2"/>
@@ -38,21 +38,20 @@
     <p:sldId id="378" r:id="rId29"/>
     <p:sldId id="377" r:id="rId30"/>
     <p:sldId id="381" r:id="rId31"/>
-    <p:sldId id="382" r:id="rId32"/>
-    <p:sldId id="383" r:id="rId33"/>
-    <p:sldId id="384" r:id="rId34"/>
-    <p:sldId id="390" r:id="rId35"/>
-    <p:sldId id="386" r:id="rId36"/>
-    <p:sldId id="387" r:id="rId37"/>
+    <p:sldId id="397" r:id="rId32"/>
+    <p:sldId id="382" r:id="rId33"/>
+    <p:sldId id="383" r:id="rId34"/>
+    <p:sldId id="384" r:id="rId35"/>
+    <p:sldId id="390" r:id="rId36"/>
+    <p:sldId id="386" r:id="rId37"/>
     <p:sldId id="388" r:id="rId38"/>
     <p:sldId id="389" r:id="rId39"/>
     <p:sldId id="391" r:id="rId40"/>
     <p:sldId id="392" r:id="rId41"/>
-    <p:sldId id="393" r:id="rId42"/>
-    <p:sldId id="394" r:id="rId43"/>
-    <p:sldId id="396" r:id="rId44"/>
-    <p:sldId id="395" r:id="rId45"/>
-    <p:sldId id="275" r:id="rId46"/>
+    <p:sldId id="394" r:id="rId42"/>
+    <p:sldId id="396" r:id="rId43"/>
+    <p:sldId id="395" r:id="rId44"/>
+    <p:sldId id="275" r:id="rId45"/>
   </p:sldIdLst>
   <p:sldSz cx="12192000" cy="6858000"/>
   <p:notesSz cx="6858000" cy="9144000"/>
@@ -1210,7 +1209,7 @@
           <a:p>
             <a:r>
               <a:rPr lang="en-US" b="0" i="0" dirty="0"/>
-              <a:t>Now, Teleop still says to set the motor power to 25%, but the motor will affect the potentiometer. We can then read that potentiometer in Tele-op to know the arm did.</a:t>
+              <a:t>Now, Teleop still says to set the motor power to 25%, but the motor will affect the potentiometer. We can then read that potentiometer in Tele-op to know what the arm did.</a:t>
             </a:r>
           </a:p>
         </p:txBody>
@@ -1472,15 +1471,6 @@
           <a:p>
             <a:r>
               <a:rPr lang="en-US" dirty="0"/>
-              <a:t>PID is a methodology of closed loop feedback/control that allows for fast response times.</a:t>
-            </a:r>
-          </a:p>
-          <a:p>
-            <a:endParaRPr lang="en-US" dirty="0"/>
-          </a:p>
-          <a:p>
-            <a:r>
-              <a:rPr lang="en-US" dirty="0"/>
               <a:t>From Wikipedia: </a:t>
             </a:r>
             <a:r>
@@ -1847,13 +1837,49 @@
             </a:r>
           </a:p>
           <a:p>
-            <a:r>
-              <a:rPr lang="en-US" dirty="0"/>
-              <a:t>{TODO: example from past year}</a:t>
-            </a:r>
-            <a:br>
-              <a:rPr lang="en-US" dirty="0"/>
-            </a:br>
+            <a:endParaRPr lang="en-US" dirty="0"/>
+          </a:p>
+          <a:p>
+            <a:r>
+              <a:rPr lang="en-US" dirty="0"/>
+              <a:t>In 2016, (Stronghold) robots got 10 points for crossing a defense and 10 points for scoring in the high goal in auto. A lot of teams that have learned to prioritize Auto got these consistently.</a:t>
+            </a:r>
+          </a:p>
+          <a:p>
+            <a:endParaRPr lang="en-US" dirty="0"/>
+          </a:p>
+          <a:p>
+            <a:r>
+              <a:rPr lang="en-US" dirty="0"/>
+              <a:t>Let’s say for the sake of argument that they were only 90% consistent. 90% x 20 points is an expected 18 points per match.</a:t>
+            </a:r>
+          </a:p>
+          <a:p>
+            <a:endParaRPr lang="en-US" dirty="0"/>
+          </a:p>
+          <a:p>
+            <a:r>
+              <a:rPr lang="en-US" dirty="0"/>
+              <a:t>On the other hand, that year a team could climb in the end game for 15 points. A lot of robots had difficulty getting through the match, onto the tower grounds, and climbing. But even if they were 100% consistent at this, that would only be an expected 15 points per match (which is less than 18).</a:t>
+            </a:r>
+          </a:p>
+          <a:p>
+            <a:endParaRPr lang="en-US" dirty="0"/>
+          </a:p>
+          <a:p>
+            <a:r>
+              <a:rPr lang="en-US" dirty="0"/>
+              <a:t>You might say that’s not a lot less, and it’s not. But in putting in the effort to have a consistent auto and trained drivers, you can be prepared to widen that gap.</a:t>
+            </a:r>
+          </a:p>
+          <a:p>
+            <a:endParaRPr lang="en-US" dirty="0"/>
+          </a:p>
+          <a:p>
+            <a:r>
+              <a:rPr lang="en-US" dirty="0"/>
+              <a:t>Don’t get me wrong, top teams will do both and have better than 90% success at it, but in my experience, a lot of teams that could be competitive are not prioritizing auto enough to compete with the stronger teams.</a:t>
+            </a:r>
             <a:br>
               <a:rPr lang="en-US" dirty="0"/>
             </a:br>
@@ -2613,7 +2639,15 @@
           <a:p>
             <a:r>
               <a:rPr lang="en-US" dirty="0"/>
-              <a:t>TODO</a:t>
+              <a:t>Read the desired angle (a control), and the current angle (from the gyro), bound the output to [-1, 1], us 1 as the </a:t>
+            </a:r>
+            <a:r>
+              <a:rPr lang="en-US" dirty="0" err="1"/>
+              <a:t>the</a:t>
+            </a:r>
+            <a:r>
+              <a:rPr lang="en-US" dirty="0"/>
+              <a:t> proportional constant and .01 as the integral constant – use the result as the steering on Arcade Drive (in effect, a drive straight).</a:t>
             </a:r>
           </a:p>
         </p:txBody>
@@ -2700,7 +2734,7 @@
           <a:p>
             <a:r>
               <a:rPr lang="en-US" dirty="0"/>
-              <a:t>Next </a:t>
+              <a:t>Next, some examples of effective sensors to use.</a:t>
             </a:r>
           </a:p>
         </p:txBody>
@@ -2869,83 +2903,6 @@
           <a:bodyPr/>
           <a:lstStyle/>
           <a:p>
-            <a:r>
-              <a:rPr lang="en-US" dirty="0"/>
-              <a:t>Drive-train </a:t>
-            </a:r>
-          </a:p>
-          <a:p>
-            <a:pPr marL="171450" indent="-171450">
-              <a:buFont typeface="Arial" panose="020B0604020202020204" pitchFamily="34" charset="0"/>
-              <a:buChar char="•"/>
-            </a:pPr>
-            <a:r>
-              <a:rPr lang="en-US" dirty="0"/>
-              <a:t>likely to travel more than 10 rotations in a given match</a:t>
-            </a:r>
-          </a:p>
-          <a:p>
-            <a:pPr marL="171450" indent="-171450">
-              <a:buFont typeface="Arial" panose="020B0604020202020204" pitchFamily="34" charset="0"/>
-              <a:buChar char="•"/>
-            </a:pPr>
-            <a:r>
-              <a:rPr lang="en-US" dirty="0"/>
-              <a:t>Don’t care where the wheels are when starting, and even better – the robots starting position is 0 (good)</a:t>
-            </a:r>
-          </a:p>
-          <a:p>
-            <a:pPr marL="0" indent="0">
-              <a:buFont typeface="Arial" panose="020B0604020202020204" pitchFamily="34" charset="0"/>
-              <a:buNone/>
-            </a:pPr>
-            <a:endParaRPr lang="en-US" dirty="0"/>
-          </a:p>
-          <a:p>
-            <a:pPr marL="0" indent="0">
-              <a:buFont typeface="Arial" panose="020B0604020202020204" pitchFamily="34" charset="0"/>
-              <a:buNone/>
-            </a:pPr>
-            <a:r>
-              <a:rPr lang="en-US" dirty="0"/>
-              <a:t>Fly Wheel</a:t>
-            </a:r>
-          </a:p>
-          <a:p>
-            <a:pPr marL="171450" indent="-171450">
-              <a:buFont typeface="Arial" panose="020B0604020202020204" pitchFamily="34" charset="0"/>
-              <a:buChar char="•"/>
-            </a:pPr>
-            <a:r>
-              <a:rPr lang="en-US" dirty="0"/>
-              <a:t>Don’t care what position it starts in</a:t>
-            </a:r>
-          </a:p>
-          <a:p>
-            <a:pPr marL="171450" indent="-171450">
-              <a:buFont typeface="Arial" panose="020B0604020202020204" pitchFamily="34" charset="0"/>
-              <a:buChar char="•"/>
-            </a:pPr>
-            <a:r>
-              <a:rPr lang="en-US" dirty="0"/>
-              <a:t>Likely to rotate more than 10 rotations in a match</a:t>
-            </a:r>
-          </a:p>
-          <a:p>
-            <a:pPr marL="171450" indent="-171450">
-              <a:buFont typeface="Arial" panose="020B0604020202020204" pitchFamily="34" charset="0"/>
-              <a:buChar char="•"/>
-            </a:pPr>
-            <a:r>
-              <a:rPr lang="en-US" dirty="0"/>
-              <a:t>Care is primarily about speed</a:t>
-            </a:r>
-          </a:p>
-          <a:p>
-            <a:pPr marL="0" indent="0">
-              <a:buFont typeface="Arial" panose="020B0604020202020204" pitchFamily="34" charset="0"/>
-              <a:buNone/>
-            </a:pPr>
             <a:endParaRPr lang="en-US" dirty="0"/>
           </a:p>
         </p:txBody>
@@ -2976,7 +2933,7 @@
     </p:spTree>
     <p:extLst>
       <p:ext uri="{BB962C8B-B14F-4D97-AF65-F5344CB8AC3E}">
-        <p14:creationId xmlns:p14="http://schemas.microsoft.com/office/powerpoint/2010/main" val="2359182909"/>
+        <p14:creationId xmlns:p14="http://schemas.microsoft.com/office/powerpoint/2010/main" val="1153157693"/>
       </p:ext>
     </p:extLst>
   </p:cSld>
@@ -3137,8 +3094,82 @@
           <a:p>
             <a:r>
               <a:rPr lang="en-US" dirty="0"/>
-              <a:t>TODO: Code</a:t>
-            </a:r>
+              <a:t>Drive-train </a:t>
+            </a:r>
+          </a:p>
+          <a:p>
+            <a:pPr marL="171450" indent="-171450">
+              <a:buFont typeface="Arial" panose="020B0604020202020204" pitchFamily="34" charset="0"/>
+              <a:buChar char="•"/>
+            </a:pPr>
+            <a:r>
+              <a:rPr lang="en-US" dirty="0"/>
+              <a:t>likely to travel more than 10 rotations in a given match</a:t>
+            </a:r>
+          </a:p>
+          <a:p>
+            <a:pPr marL="171450" indent="-171450">
+              <a:buFont typeface="Arial" panose="020B0604020202020204" pitchFamily="34" charset="0"/>
+              <a:buChar char="•"/>
+            </a:pPr>
+            <a:r>
+              <a:rPr lang="en-US" dirty="0"/>
+              <a:t>Don’t care where the wheels are when starting, and even better – the robots starting position is 0 (good)</a:t>
+            </a:r>
+          </a:p>
+          <a:p>
+            <a:pPr marL="0" indent="0">
+              <a:buFont typeface="Arial" panose="020B0604020202020204" pitchFamily="34" charset="0"/>
+              <a:buNone/>
+            </a:pPr>
+            <a:endParaRPr lang="en-US" dirty="0"/>
+          </a:p>
+          <a:p>
+            <a:pPr marL="0" indent="0">
+              <a:buFont typeface="Arial" panose="020B0604020202020204" pitchFamily="34" charset="0"/>
+              <a:buNone/>
+            </a:pPr>
+            <a:r>
+              <a:rPr lang="en-US" dirty="0"/>
+              <a:t>Fly Wheel</a:t>
+            </a:r>
+          </a:p>
+          <a:p>
+            <a:pPr marL="171450" indent="-171450">
+              <a:buFont typeface="Arial" panose="020B0604020202020204" pitchFamily="34" charset="0"/>
+              <a:buChar char="•"/>
+            </a:pPr>
+            <a:r>
+              <a:rPr lang="en-US" dirty="0"/>
+              <a:t>Don’t care what position it starts in</a:t>
+            </a:r>
+          </a:p>
+          <a:p>
+            <a:pPr marL="171450" indent="-171450">
+              <a:buFont typeface="Arial" panose="020B0604020202020204" pitchFamily="34" charset="0"/>
+              <a:buChar char="•"/>
+            </a:pPr>
+            <a:r>
+              <a:rPr lang="en-US" dirty="0"/>
+              <a:t>Likely to rotate more than 10 rotations in a match</a:t>
+            </a:r>
+          </a:p>
+          <a:p>
+            <a:pPr marL="171450" indent="-171450">
+              <a:buFont typeface="Arial" panose="020B0604020202020204" pitchFamily="34" charset="0"/>
+              <a:buChar char="•"/>
+            </a:pPr>
+            <a:r>
+              <a:rPr lang="en-US" dirty="0"/>
+              <a:t>Care is primarily about speed</a:t>
+            </a:r>
+          </a:p>
+          <a:p>
+            <a:pPr marL="0" indent="0">
+              <a:buFont typeface="Arial" panose="020B0604020202020204" pitchFamily="34" charset="0"/>
+              <a:buNone/>
+            </a:pPr>
+            <a:endParaRPr lang="en-US" dirty="0"/>
           </a:p>
         </p:txBody>
       </p:sp>
@@ -3168,7 +3199,7 @@
     </p:spTree>
     <p:extLst>
       <p:ext uri="{BB962C8B-B14F-4D97-AF65-F5344CB8AC3E}">
-        <p14:creationId xmlns:p14="http://schemas.microsoft.com/office/powerpoint/2010/main" val="3910257218"/>
+        <p14:creationId xmlns:p14="http://schemas.microsoft.com/office/powerpoint/2010/main" val="2359182909"/>
       </p:ext>
     </p:extLst>
   </p:cSld>
@@ -3222,10 +3253,7 @@
           <a:bodyPr/>
           <a:lstStyle/>
           <a:p>
-            <a:r>
-              <a:rPr lang="en-US" dirty="0"/>
-              <a:t>TODO: Code</a:t>
-            </a:r>
+            <a:endParaRPr lang="en-US" dirty="0"/>
           </a:p>
         </p:txBody>
       </p:sp>
@@ -3255,7 +3283,7 @@
     </p:spTree>
     <p:extLst>
       <p:ext uri="{BB962C8B-B14F-4D97-AF65-F5344CB8AC3E}">
-        <p14:creationId xmlns:p14="http://schemas.microsoft.com/office/powerpoint/2010/main" val="711609069"/>
+        <p14:creationId xmlns:p14="http://schemas.microsoft.com/office/powerpoint/2010/main" val="3910257218"/>
       </p:ext>
     </p:extLst>
   </p:cSld>
@@ -3309,10 +3337,7 @@
           <a:bodyPr/>
           <a:lstStyle/>
           <a:p>
-            <a:r>
-              <a:rPr lang="en-US" dirty="0"/>
-              <a:t>TODO: Code</a:t>
-            </a:r>
+            <a:endParaRPr lang="en-US" dirty="0"/>
           </a:p>
         </p:txBody>
       </p:sp>
@@ -3342,7 +3367,7 @@
     </p:spTree>
     <p:extLst>
       <p:ext uri="{BB962C8B-B14F-4D97-AF65-F5344CB8AC3E}">
-        <p14:creationId xmlns:p14="http://schemas.microsoft.com/office/powerpoint/2010/main" val="2010227119"/>
+        <p14:creationId xmlns:p14="http://schemas.microsoft.com/office/powerpoint/2010/main" val="711609069"/>
       </p:ext>
     </p:extLst>
   </p:cSld>
@@ -3396,40 +3421,9 @@
           <a:bodyPr/>
           <a:lstStyle/>
           <a:p>
-            <a:pPr marL="0" indent="0">
-              <a:buFont typeface="Arial" panose="020B0604020202020204" pitchFamily="34" charset="0"/>
-              <a:buNone/>
-            </a:pPr>
-            <a:r>
-              <a:rPr lang="en-US" dirty="0"/>
-              <a:t>Arm angles:</a:t>
-            </a:r>
-          </a:p>
-          <a:p>
-            <a:pPr marL="171450" indent="-171450">
-              <a:buFont typeface="Arial" panose="020B0604020202020204" pitchFamily="34" charset="0"/>
-              <a:buChar char="•"/>
-            </a:pPr>
-            <a:r>
-              <a:rPr lang="en-US" dirty="0"/>
-              <a:t>Care about absolute position (0 should always mean on the ground regardless of where the arm was when we turn it on).</a:t>
-            </a:r>
-          </a:p>
-          <a:p>
-            <a:pPr marL="0" indent="0">
-              <a:buFont typeface="Arial" panose="020B0604020202020204" pitchFamily="34" charset="0"/>
-              <a:buNone/>
-            </a:pPr>
-            <a:endParaRPr lang="en-US" dirty="0"/>
-          </a:p>
-          <a:p>
-            <a:pPr marL="0" indent="0">
-              <a:buFont typeface="Arial" panose="020B0604020202020204" pitchFamily="34" charset="0"/>
-              <a:buNone/>
-            </a:pPr>
-            <a:r>
-              <a:rPr lang="en-US" dirty="0"/>
-              <a:t>Same for elevators and similar manipulators</a:t>
+            <a:r>
+              <a:rPr lang="en-US" dirty="0"/>
+              <a:t>TODO: Code</a:t>
             </a:r>
           </a:p>
         </p:txBody>
@@ -3460,7 +3454,7 @@
     </p:spTree>
     <p:extLst>
       <p:ext uri="{BB962C8B-B14F-4D97-AF65-F5344CB8AC3E}">
-        <p14:creationId xmlns:p14="http://schemas.microsoft.com/office/powerpoint/2010/main" val="2109796474"/>
+        <p14:creationId xmlns:p14="http://schemas.microsoft.com/office/powerpoint/2010/main" val="2010227119"/>
       </p:ext>
     </p:extLst>
   </p:cSld>
@@ -3514,9 +3508,40 @@
           <a:bodyPr/>
           <a:lstStyle/>
           <a:p>
-            <a:r>
-              <a:rPr lang="en-US" dirty="0"/>
-              <a:t>TODO: Code</a:t>
+            <a:pPr marL="0" indent="0">
+              <a:buFont typeface="Arial" panose="020B0604020202020204" pitchFamily="34" charset="0"/>
+              <a:buNone/>
+            </a:pPr>
+            <a:r>
+              <a:rPr lang="en-US" dirty="0"/>
+              <a:t>Arm angles:</a:t>
+            </a:r>
+          </a:p>
+          <a:p>
+            <a:pPr marL="171450" indent="-171450">
+              <a:buFont typeface="Arial" panose="020B0604020202020204" pitchFamily="34" charset="0"/>
+              <a:buChar char="•"/>
+            </a:pPr>
+            <a:r>
+              <a:rPr lang="en-US" dirty="0"/>
+              <a:t>Care about absolute position (0 should always mean on the ground regardless of where the arm was when we turn it on).</a:t>
+            </a:r>
+          </a:p>
+          <a:p>
+            <a:pPr marL="0" indent="0">
+              <a:buFont typeface="Arial" panose="020B0604020202020204" pitchFamily="34" charset="0"/>
+              <a:buNone/>
+            </a:pPr>
+            <a:endParaRPr lang="en-US" dirty="0"/>
+          </a:p>
+          <a:p>
+            <a:pPr marL="0" indent="0">
+              <a:buFont typeface="Arial" panose="020B0604020202020204" pitchFamily="34" charset="0"/>
+              <a:buNone/>
+            </a:pPr>
+            <a:r>
+              <a:rPr lang="en-US" dirty="0"/>
+              <a:t>Same for elevators and similar manipulators</a:t>
             </a:r>
           </a:p>
         </p:txBody>
@@ -3547,7 +3572,7 @@
     </p:spTree>
     <p:extLst>
       <p:ext uri="{BB962C8B-B14F-4D97-AF65-F5344CB8AC3E}">
-        <p14:creationId xmlns:p14="http://schemas.microsoft.com/office/powerpoint/2010/main" val="2358725069"/>
+        <p14:creationId xmlns:p14="http://schemas.microsoft.com/office/powerpoint/2010/main" val="2109796474"/>
       </p:ext>
     </p:extLst>
   </p:cSld>
@@ -3601,10 +3626,7 @@
           <a:bodyPr/>
           <a:lstStyle/>
           <a:p>
-            <a:r>
-              <a:rPr lang="en-US" dirty="0"/>
-              <a:t>TODO: Code</a:t>
-            </a:r>
+            <a:endParaRPr lang="en-US" dirty="0"/>
           </a:p>
         </p:txBody>
       </p:sp>
@@ -3690,7 +3712,16 @@
           <a:p>
             <a:r>
               <a:rPr lang="en-US" dirty="0"/>
-              <a:t>One disadvantage that potentiometers have when compared to encoders is now you care very much about the position of the potentiometer when mounting/unmounting it. I’m not going to go into this today, but there is a documented, simple way to apply a known offset when reading potentiometers – you would then update this offset after doing modifications.</a:t>
+              <a:t>One disadvantage that potentiometers have when compared to encoders is now you care very much about the position of the potentiometer when mounting/unmounting it. </a:t>
+            </a:r>
+          </a:p>
+          <a:p>
+            <a:endParaRPr lang="en-US" dirty="0"/>
+          </a:p>
+          <a:p>
+            <a:r>
+              <a:rPr lang="en-US" dirty="0"/>
+              <a:t>I’m not going to go into this today, but there is a documented, simple way to apply a known offset when reading potentiometers – you would then update this offset after doing modifications.</a:t>
             </a:r>
           </a:p>
         </p:txBody>
@@ -3775,10 +3806,7 @@
           <a:bodyPr/>
           <a:lstStyle/>
           <a:p>
-            <a:r>
-              <a:rPr lang="en-US" dirty="0"/>
-              <a:t>TODO: Code</a:t>
-            </a:r>
+            <a:endParaRPr lang="en-US" dirty="0"/>
           </a:p>
         </p:txBody>
       </p:sp>
@@ -3862,10 +3890,7 @@
           <a:bodyPr/>
           <a:lstStyle/>
           <a:p>
-            <a:r>
-              <a:rPr lang="en-US" dirty="0"/>
-              <a:t>TODO: Code</a:t>
-            </a:r>
+            <a:endParaRPr lang="en-US" dirty="0"/>
           </a:p>
         </p:txBody>
       </p:sp>
@@ -3949,18 +3974,7 @@
           <a:bodyPr/>
           <a:lstStyle/>
           <a:p>
-            <a:r>
-              <a:rPr lang="en-US" dirty="0"/>
-              <a:t>TODO: code for both </a:t>
-            </a:r>
-            <a:r>
-              <a:rPr lang="en-US" dirty="0" err="1"/>
-              <a:t>NavX</a:t>
-            </a:r>
-            <a:r>
-              <a:rPr lang="en-US" dirty="0"/>
-              <a:t> and the AI one</a:t>
-            </a:r>
+            <a:endParaRPr lang="en-US" dirty="0"/>
           </a:p>
         </p:txBody>
       </p:sp>
@@ -3990,7 +4004,7 @@
     </p:spTree>
     <p:extLst>
       <p:ext uri="{BB962C8B-B14F-4D97-AF65-F5344CB8AC3E}">
-        <p14:creationId xmlns:p14="http://schemas.microsoft.com/office/powerpoint/2010/main" val="2562631791"/>
+        <p14:creationId xmlns:p14="http://schemas.microsoft.com/office/powerpoint/2010/main" val="1794942294"/>
       </p:ext>
     </p:extLst>
   </p:cSld>
@@ -4128,18 +4142,7 @@
           <a:bodyPr/>
           <a:lstStyle/>
           <a:p>
-            <a:r>
-              <a:rPr lang="en-US" dirty="0"/>
-              <a:t>TODO: code for both </a:t>
-            </a:r>
-            <a:r>
-              <a:rPr lang="en-US" dirty="0" err="1"/>
-              <a:t>NavX</a:t>
-            </a:r>
-            <a:r>
-              <a:rPr lang="en-US" dirty="0"/>
-              <a:t> and the AI one</a:t>
-            </a:r>
+            <a:endParaRPr lang="en-US" dirty="0"/>
           </a:p>
         </p:txBody>
       </p:sp>
@@ -4160,91 +4163,7 @@
           <a:p>
             <a:fld id="{7869CEDA-A88F-405F-B085-0C49B47076E2}" type="slidenum">
               <a:rPr lang="en-US" smtClean="0"/>
-              <a:t>42</a:t>
-            </a:fld>
-            <a:endParaRPr lang="en-US"/>
-          </a:p>
-        </p:txBody>
-      </p:sp>
-    </p:spTree>
-    <p:extLst>
-      <p:ext uri="{BB962C8B-B14F-4D97-AF65-F5344CB8AC3E}">
-        <p14:creationId xmlns:p14="http://schemas.microsoft.com/office/powerpoint/2010/main" val="1794942294"/>
-      </p:ext>
-    </p:extLst>
-  </p:cSld>
-  <p:clrMapOvr>
-    <a:masterClrMapping/>
-  </p:clrMapOvr>
-</p:notes>
-</file>
-
-<file path=ppt/notesSlides/notesSlide41.xml><?xml version="1.0" encoding="utf-8"?>
-<p:notes xmlns:a="http://schemas.openxmlformats.org/drawingml/2006/main" xmlns:r="http://schemas.openxmlformats.org/officeDocument/2006/relationships" xmlns:p="http://schemas.openxmlformats.org/presentationml/2006/main">
-  <p:cSld>
-    <p:spTree>
-      <p:nvGrpSpPr>
-        <p:cNvPr id="1" name=""/>
-        <p:cNvGrpSpPr/>
-        <p:nvPr/>
-      </p:nvGrpSpPr>
-      <p:grpSpPr>
-        <a:xfrm>
-          <a:off x="0" y="0"/>
-          <a:ext cx="0" cy="0"/>
-          <a:chOff x="0" y="0"/>
-          <a:chExt cx="0" cy="0"/>
-        </a:xfrm>
-      </p:grpSpPr>
-      <p:sp>
-        <p:nvSpPr>
-          <p:cNvPr id="2" name="Slide Image Placeholder 1"/>
-          <p:cNvSpPr>
-            <a:spLocks noGrp="1" noRot="1" noChangeAspect="1"/>
-          </p:cNvSpPr>
-          <p:nvPr>
-            <p:ph type="sldImg"/>
-          </p:nvPr>
-        </p:nvSpPr>
-        <p:spPr/>
-      </p:sp>
-      <p:sp>
-        <p:nvSpPr>
-          <p:cNvPr id="3" name="Notes Placeholder 2"/>
-          <p:cNvSpPr>
-            <a:spLocks noGrp="1"/>
-          </p:cNvSpPr>
-          <p:nvPr>
-            <p:ph type="body" idx="1"/>
-          </p:nvPr>
-        </p:nvSpPr>
-        <p:spPr/>
-        <p:txBody>
-          <a:bodyPr/>
-          <a:lstStyle/>
-          <a:p>
-            <a:endParaRPr lang="en-US" dirty="0"/>
-          </a:p>
-        </p:txBody>
-      </p:sp>
-      <p:sp>
-        <p:nvSpPr>
-          <p:cNvPr id="4" name="Slide Number Placeholder 3"/>
-          <p:cNvSpPr>
-            <a:spLocks noGrp="1"/>
-          </p:cNvSpPr>
-          <p:nvPr>
-            <p:ph type="sldNum" sz="quarter" idx="5"/>
-          </p:nvPr>
-        </p:nvSpPr>
-        <p:spPr/>
-        <p:txBody>
-          <a:bodyPr/>
-          <a:lstStyle/>
-          <a:p>
-            <a:fld id="{7869CEDA-A88F-405F-B085-0C49B47076E2}" type="slidenum">
-              <a:rPr lang="en-US" smtClean="0"/>
-              <a:t>44</a:t>
+              <a:t>43</a:t>
             </a:fld>
             <a:endParaRPr lang="en-US"/>
           </a:p>
@@ -12258,6 +12177,42 @@
           </a:p>
         </p:txBody>
       </p:sp>
+      <p:pic>
+        <p:nvPicPr>
+          <p:cNvPr id="5" name="Picture 4">
+            <a:extLst>
+              <a:ext uri="{FF2B5EF4-FFF2-40B4-BE49-F238E27FC236}">
+                <a16:creationId xmlns:a16="http://schemas.microsoft.com/office/drawing/2014/main" id="{C89ABEE7-0CCF-4562-BF4E-129F854A05D6}"/>
+              </a:ext>
+            </a:extLst>
+          </p:cNvPr>
+          <p:cNvPicPr>
+            <a:picLocks noChangeAspect="1"/>
+          </p:cNvPicPr>
+          <p:nvPr/>
+        </p:nvPicPr>
+        <p:blipFill>
+          <a:blip r:embed="rId3">
+            <a:extLst>
+              <a:ext uri="{28A0092B-C50C-407E-A947-70E740481C1C}">
+                <a14:useLocalDpi xmlns:a14="http://schemas.microsoft.com/office/drawing/2010/main" val="0"/>
+              </a:ext>
+            </a:extLst>
+          </a:blip>
+          <a:stretch>
+            <a:fillRect/>
+          </a:stretch>
+        </p:blipFill>
+        <p:spPr>
+          <a:xfrm>
+            <a:off x="2362200" y="2341959"/>
+            <a:ext cx="6781800" cy="4203303"/>
+          </a:xfrm>
+          <a:prstGeom prst="rect">
+            <a:avLst/>
+          </a:prstGeom>
+        </p:spPr>
+      </p:pic>
     </p:spTree>
     <p:extLst>
       <p:ext uri="{BB962C8B-B14F-4D97-AF65-F5344CB8AC3E}">
@@ -12688,31 +12643,7 @@
           <a:bodyPr/>
           <a:lstStyle/>
           <a:p>
-            <a:r>
-              <a:rPr lang="en-US" dirty="0"/>
-              <a:t>Places to use encoders:</a:t>
-            </a:r>
-          </a:p>
-          <a:p>
-            <a:pPr lvl="1"/>
-            <a:r>
-              <a:rPr lang="en-US" dirty="0"/>
-              <a:t>When trying to measure rotation speed</a:t>
-            </a:r>
-          </a:p>
-          <a:p>
-            <a:pPr lvl="1"/>
-            <a:r>
-              <a:rPr lang="en-US" dirty="0"/>
-              <a:t>Trying to measure rotational distances possibly greater than 8 rotations.</a:t>
-            </a:r>
-          </a:p>
-          <a:p>
-            <a:pPr lvl="1"/>
-            <a:r>
-              <a:rPr lang="en-US" dirty="0"/>
-              <a:t>Don’t care about starting position</a:t>
-            </a:r>
+            <a:endParaRPr lang="en-US" dirty="0"/>
           </a:p>
         </p:txBody>
       </p:sp>
@@ -12816,7 +12747,7 @@
             <a:pPr lvl="1"/>
             <a:r>
               <a:rPr lang="en-US" dirty="0"/>
-              <a:t>When trying to measure rotation speed</a:t>
+              <a:t>When trying to measure rotational speed</a:t>
             </a:r>
           </a:p>
           <a:p>
@@ -12831,26 +12762,6 @@
             <a:r>
               <a:rPr lang="en-US" dirty="0"/>
               <a:t>Don’t care about starting position</a:t>
-            </a:r>
-          </a:p>
-          <a:p>
-            <a:r>
-              <a:rPr lang="en-US" dirty="0"/>
-              <a:t>Examples:</a:t>
-            </a:r>
-          </a:p>
-          <a:p>
-            <a:pPr lvl="1"/>
-            <a:r>
-              <a:rPr lang="en-US" dirty="0"/>
-              <a:t>Drive train</a:t>
-            </a:r>
-          </a:p>
-          <a:p>
-            <a:pPr lvl="1"/>
-            <a:r>
-              <a:rPr lang="en-US" dirty="0"/>
-              <a:t>Fly Wheel/wheeled shooter</a:t>
             </a:r>
           </a:p>
         </p:txBody>
@@ -12858,7 +12769,7 @@
     </p:spTree>
     <p:extLst>
       <p:ext uri="{BB962C8B-B14F-4D97-AF65-F5344CB8AC3E}">
-        <p14:creationId xmlns:p14="http://schemas.microsoft.com/office/powerpoint/2010/main" val="3218113474"/>
+        <p14:creationId xmlns:p14="http://schemas.microsoft.com/office/powerpoint/2010/main" val="834306305"/>
       </p:ext>
     </p:extLst>
   </p:cSld>
@@ -12902,7 +12813,7 @@
           <p:cNvPr id="2" name="Title 1">
             <a:extLst>
               <a:ext uri="{FF2B5EF4-FFF2-40B4-BE49-F238E27FC236}">
-                <a16:creationId xmlns:a16="http://schemas.microsoft.com/office/drawing/2014/main" id="{304F9954-9957-46AD-B592-76BA648030F3}"/>
+                <a16:creationId xmlns:a16="http://schemas.microsoft.com/office/drawing/2014/main" id="{AD2C20C2-FF0B-4B88-B4BF-6C2D56389896}"/>
               </a:ext>
             </a:extLst>
           </p:cNvPr>
@@ -12930,7 +12841,7 @@
           <p:cNvPr id="3" name="Content Placeholder 2">
             <a:extLst>
               <a:ext uri="{FF2B5EF4-FFF2-40B4-BE49-F238E27FC236}">
-                <a16:creationId xmlns:a16="http://schemas.microsoft.com/office/drawing/2014/main" id="{5AC7961B-E8AB-4BB7-A0E7-B88A258F0DE3}"/>
+                <a16:creationId xmlns:a16="http://schemas.microsoft.com/office/drawing/2014/main" id="{C427F670-0C8D-4BC6-BE62-2DFD10714244}"/>
               </a:ext>
             </a:extLst>
           </p:cNvPr>
@@ -12948,7 +12859,48 @@
           <a:p>
             <a:r>
               <a:rPr lang="en-US" dirty="0"/>
-              <a:t>Reading</a:t>
+              <a:t>Places to use encoders:</a:t>
+            </a:r>
+          </a:p>
+          <a:p>
+            <a:pPr lvl="1"/>
+            <a:r>
+              <a:rPr lang="en-US" dirty="0"/>
+              <a:t>When trying to measure rotation speed</a:t>
+            </a:r>
+          </a:p>
+          <a:p>
+            <a:pPr lvl="1"/>
+            <a:r>
+              <a:rPr lang="en-US" dirty="0"/>
+              <a:t>Trying to measure rotational distances possibly greater than 8 rotations.</a:t>
+            </a:r>
+          </a:p>
+          <a:p>
+            <a:pPr lvl="1"/>
+            <a:r>
+              <a:rPr lang="en-US" dirty="0"/>
+              <a:t>Don’t care about starting position</a:t>
+            </a:r>
+          </a:p>
+          <a:p>
+            <a:r>
+              <a:rPr lang="en-US" dirty="0"/>
+              <a:t>Examples:</a:t>
+            </a:r>
+          </a:p>
+          <a:p>
+            <a:pPr lvl="1"/>
+            <a:r>
+              <a:rPr lang="en-US" dirty="0"/>
+              <a:t>Drive train</a:t>
+            </a:r>
+          </a:p>
+          <a:p>
+            <a:pPr lvl="1"/>
+            <a:r>
+              <a:rPr lang="en-US" dirty="0"/>
+              <a:t>Fly Wheel/wheeled shooter</a:t>
             </a:r>
           </a:p>
         </p:txBody>
@@ -12956,7 +12908,7 @@
     </p:spTree>
     <p:extLst>
       <p:ext uri="{BB962C8B-B14F-4D97-AF65-F5344CB8AC3E}">
-        <p14:creationId xmlns:p14="http://schemas.microsoft.com/office/powerpoint/2010/main" val="948182650"/>
+        <p14:creationId xmlns:p14="http://schemas.microsoft.com/office/powerpoint/2010/main" val="3218113474"/>
       </p:ext>
     </p:extLst>
   </p:cSld>
@@ -13000,7 +12952,7 @@
           <p:cNvPr id="2" name="Title 1">
             <a:extLst>
               <a:ext uri="{FF2B5EF4-FFF2-40B4-BE49-F238E27FC236}">
-                <a16:creationId xmlns:a16="http://schemas.microsoft.com/office/drawing/2014/main" id="{D732B769-3552-4055-AC6B-6FE38EB4F403}"/>
+                <a16:creationId xmlns:a16="http://schemas.microsoft.com/office/drawing/2014/main" id="{304F9954-9957-46AD-B592-76BA648030F3}"/>
               </a:ext>
             </a:extLst>
           </p:cNvPr>
@@ -13028,7 +12980,7 @@
           <p:cNvPr id="3" name="Content Placeholder 2">
             <a:extLst>
               <a:ext uri="{FF2B5EF4-FFF2-40B4-BE49-F238E27FC236}">
-                <a16:creationId xmlns:a16="http://schemas.microsoft.com/office/drawing/2014/main" id="{4FE11574-B6BF-4EDE-B177-61FAA3E08C4E}"/>
+                <a16:creationId xmlns:a16="http://schemas.microsoft.com/office/drawing/2014/main" id="{5AC7961B-E8AB-4BB7-A0E7-B88A258F0DE3}"/>
               </a:ext>
             </a:extLst>
           </p:cNvPr>
@@ -13044,20 +12996,53 @@
           <a:bodyPr/>
           <a:lstStyle/>
           <a:p>
-            <a:endParaRPr lang="en-US" dirty="0"/>
-          </a:p>
-          <a:p>
-            <a:r>
-              <a:rPr lang="en-US" dirty="0"/>
-              <a:t>Control</a:t>
-            </a:r>
-          </a:p>
-        </p:txBody>
-      </p:sp>
+            <a:r>
+              <a:rPr lang="en-US" dirty="0"/>
+              <a:t>Reading</a:t>
+            </a:r>
+          </a:p>
+        </p:txBody>
+      </p:sp>
+      <p:pic>
+        <p:nvPicPr>
+          <p:cNvPr id="9" name="Picture 8">
+            <a:extLst>
+              <a:ext uri="{FF2B5EF4-FFF2-40B4-BE49-F238E27FC236}">
+                <a16:creationId xmlns:a16="http://schemas.microsoft.com/office/drawing/2014/main" id="{514B0F7F-8742-4914-9078-C399CDC2C5F7}"/>
+              </a:ext>
+            </a:extLst>
+          </p:cNvPr>
+          <p:cNvPicPr>
+            <a:picLocks noChangeAspect="1"/>
+          </p:cNvPicPr>
+          <p:nvPr/>
+        </p:nvPicPr>
+        <p:blipFill>
+          <a:blip r:embed="rId3">
+            <a:extLst>
+              <a:ext uri="{28A0092B-C50C-407E-A947-70E740481C1C}">
+                <a14:useLocalDpi xmlns:a14="http://schemas.microsoft.com/office/drawing/2010/main" val="0"/>
+              </a:ext>
+            </a:extLst>
+          </a:blip>
+          <a:stretch>
+            <a:fillRect/>
+          </a:stretch>
+        </p:blipFill>
+        <p:spPr>
+          <a:xfrm>
+            <a:off x="2531916" y="2510632"/>
+            <a:ext cx="7128167" cy="3577432"/>
+          </a:xfrm>
+          <a:prstGeom prst="rect">
+            <a:avLst/>
+          </a:prstGeom>
+        </p:spPr>
+      </p:pic>
     </p:spTree>
     <p:extLst>
       <p:ext uri="{BB962C8B-B14F-4D97-AF65-F5344CB8AC3E}">
-        <p14:creationId xmlns:p14="http://schemas.microsoft.com/office/powerpoint/2010/main" val="1594744113"/>
+        <p14:creationId xmlns:p14="http://schemas.microsoft.com/office/powerpoint/2010/main" val="948182650"/>
       </p:ext>
     </p:extLst>
   </p:cSld>
@@ -13119,7 +13104,7 @@
           <a:p>
             <a:r>
               <a:rPr lang="en-US" dirty="0"/>
-              <a:t>Sensors - Potentiometer</a:t>
+              <a:t>Sensors - Encoder</a:t>
             </a:r>
           </a:p>
         </p:txBody>
@@ -13147,12 +13132,54 @@
           <a:p>
             <a:endParaRPr lang="en-US" dirty="0"/>
           </a:p>
-        </p:txBody>
-      </p:sp>
+          <a:p>
+            <a:r>
+              <a:rPr lang="en-US" dirty="0"/>
+              <a:t>Control</a:t>
+            </a:r>
+          </a:p>
+        </p:txBody>
+      </p:sp>
+      <p:pic>
+        <p:nvPicPr>
+          <p:cNvPr id="4" name="Picture 3">
+            <a:extLst>
+              <a:ext uri="{FF2B5EF4-FFF2-40B4-BE49-F238E27FC236}">
+                <a16:creationId xmlns:a16="http://schemas.microsoft.com/office/drawing/2014/main" id="{EE21C929-BD60-4319-9500-BEC20400B569}"/>
+              </a:ext>
+            </a:extLst>
+          </p:cNvPr>
+          <p:cNvPicPr>
+            <a:picLocks noChangeAspect="1"/>
+          </p:cNvPicPr>
+          <p:nvPr/>
+        </p:nvPicPr>
+        <p:blipFill>
+          <a:blip r:embed="rId3">
+            <a:extLst>
+              <a:ext uri="{28A0092B-C50C-407E-A947-70E740481C1C}">
+                <a14:useLocalDpi xmlns:a14="http://schemas.microsoft.com/office/drawing/2010/main" val="0"/>
+              </a:ext>
+            </a:extLst>
+          </a:blip>
+          <a:stretch>
+            <a:fillRect/>
+          </a:stretch>
+        </p:blipFill>
+        <p:spPr>
+          <a:xfrm>
+            <a:off x="1447800" y="2956718"/>
+            <a:ext cx="8403890" cy="3882232"/>
+          </a:xfrm>
+          <a:prstGeom prst="rect">
+            <a:avLst/>
+          </a:prstGeom>
+        </p:spPr>
+      </p:pic>
     </p:spTree>
     <p:extLst>
       <p:ext uri="{BB962C8B-B14F-4D97-AF65-F5344CB8AC3E}">
-        <p14:creationId xmlns:p14="http://schemas.microsoft.com/office/powerpoint/2010/main" val="3092754889"/>
+        <p14:creationId xmlns:p14="http://schemas.microsoft.com/office/powerpoint/2010/main" val="1594744113"/>
       </p:ext>
     </p:extLst>
   </p:cSld>
@@ -13196,7 +13223,7 @@
           <p:cNvPr id="2" name="Title 1">
             <a:extLst>
               <a:ext uri="{FF2B5EF4-FFF2-40B4-BE49-F238E27FC236}">
-                <a16:creationId xmlns:a16="http://schemas.microsoft.com/office/drawing/2014/main" id="{AD2C20C2-FF0B-4B88-B4BF-6C2D56389896}"/>
+                <a16:creationId xmlns:a16="http://schemas.microsoft.com/office/drawing/2014/main" id="{D732B769-3552-4055-AC6B-6FE38EB4F403}"/>
               </a:ext>
             </a:extLst>
           </p:cNvPr>
@@ -13224,7 +13251,7 @@
           <p:cNvPr id="3" name="Content Placeholder 2">
             <a:extLst>
               <a:ext uri="{FF2B5EF4-FFF2-40B4-BE49-F238E27FC236}">
-                <a16:creationId xmlns:a16="http://schemas.microsoft.com/office/drawing/2014/main" id="{C427F670-0C8D-4BC6-BE62-2DFD10714244}"/>
+                <a16:creationId xmlns:a16="http://schemas.microsoft.com/office/drawing/2014/main" id="{4FE11574-B6BF-4EDE-B177-61FAA3E08C4E}"/>
               </a:ext>
             </a:extLst>
           </p:cNvPr>
@@ -13240,51 +13267,14 @@
           <a:bodyPr/>
           <a:lstStyle/>
           <a:p>
-            <a:r>
-              <a:rPr lang="en-US" dirty="0"/>
-              <a:t>Places to use encoders:</a:t>
-            </a:r>
-          </a:p>
-          <a:p>
-            <a:pPr lvl="1"/>
-            <a:r>
-              <a:rPr lang="en-US" dirty="0"/>
-              <a:t>Trying to measure rotational distances possibly greater than 8 rotations.</a:t>
-            </a:r>
-          </a:p>
-          <a:p>
-            <a:pPr lvl="1"/>
-            <a:r>
-              <a:rPr lang="en-US" dirty="0"/>
-              <a:t>Care about starting position – or absolute positions</a:t>
-            </a:r>
-          </a:p>
-          <a:p>
-            <a:r>
-              <a:rPr lang="en-US" dirty="0"/>
-              <a:t>Examples:</a:t>
-            </a:r>
-          </a:p>
-          <a:p>
-            <a:pPr lvl="1"/>
-            <a:r>
-              <a:rPr lang="en-US" dirty="0"/>
-              <a:t>Arm angles</a:t>
-            </a:r>
-          </a:p>
-          <a:p>
-            <a:pPr lvl="1"/>
-            <a:r>
-              <a:rPr lang="en-US" dirty="0"/>
-              <a:t>Elevator positions</a:t>
-            </a:r>
+            <a:endParaRPr lang="en-US" dirty="0"/>
           </a:p>
         </p:txBody>
       </p:sp>
     </p:spTree>
     <p:extLst>
       <p:ext uri="{BB962C8B-B14F-4D97-AF65-F5344CB8AC3E}">
-        <p14:creationId xmlns:p14="http://schemas.microsoft.com/office/powerpoint/2010/main" val="4222326381"/>
+        <p14:creationId xmlns:p14="http://schemas.microsoft.com/office/powerpoint/2010/main" val="3092754889"/>
       </p:ext>
     </p:extLst>
   </p:cSld>
@@ -13328,7 +13318,7 @@
           <p:cNvPr id="2" name="Title 1">
             <a:extLst>
               <a:ext uri="{FF2B5EF4-FFF2-40B4-BE49-F238E27FC236}">
-                <a16:creationId xmlns:a16="http://schemas.microsoft.com/office/drawing/2014/main" id="{304F9954-9957-46AD-B592-76BA648030F3}"/>
+                <a16:creationId xmlns:a16="http://schemas.microsoft.com/office/drawing/2014/main" id="{AD2C20C2-FF0B-4B88-B4BF-6C2D56389896}"/>
               </a:ext>
             </a:extLst>
           </p:cNvPr>
@@ -13356,7 +13346,7 @@
           <p:cNvPr id="3" name="Content Placeholder 2">
             <a:extLst>
               <a:ext uri="{FF2B5EF4-FFF2-40B4-BE49-F238E27FC236}">
-                <a16:creationId xmlns:a16="http://schemas.microsoft.com/office/drawing/2014/main" id="{5AC7961B-E8AB-4BB7-A0E7-B88A258F0DE3}"/>
+                <a16:creationId xmlns:a16="http://schemas.microsoft.com/office/drawing/2014/main" id="{C427F670-0C8D-4BC6-BE62-2DFD10714244}"/>
               </a:ext>
             </a:extLst>
           </p:cNvPr>
@@ -13374,7 +13364,41 @@
           <a:p>
             <a:r>
               <a:rPr lang="en-US" dirty="0"/>
-              <a:t>Reading</a:t>
+              <a:t>Places to use potentiometers:</a:t>
+            </a:r>
+          </a:p>
+          <a:p>
+            <a:pPr lvl="1"/>
+            <a:r>
+              <a:rPr lang="en-US" dirty="0"/>
+              <a:t>Trying to measure rotational distances possibly greater than 8 rotations.</a:t>
+            </a:r>
+          </a:p>
+          <a:p>
+            <a:pPr lvl="1"/>
+            <a:r>
+              <a:rPr lang="en-US" dirty="0"/>
+              <a:t>Care about starting position – or absolute positions</a:t>
+            </a:r>
+          </a:p>
+          <a:p>
+            <a:r>
+              <a:rPr lang="en-US" dirty="0"/>
+              <a:t>Examples:</a:t>
+            </a:r>
+          </a:p>
+          <a:p>
+            <a:pPr lvl="1"/>
+            <a:r>
+              <a:rPr lang="en-US" dirty="0"/>
+              <a:t>Arm angles</a:t>
+            </a:r>
+          </a:p>
+          <a:p>
+            <a:pPr lvl="1"/>
+            <a:r>
+              <a:rPr lang="en-US" dirty="0"/>
+              <a:t>Elevator positions</a:t>
             </a:r>
           </a:p>
         </p:txBody>
@@ -13382,7 +13406,7 @@
     </p:spTree>
     <p:extLst>
       <p:ext uri="{BB962C8B-B14F-4D97-AF65-F5344CB8AC3E}">
-        <p14:creationId xmlns:p14="http://schemas.microsoft.com/office/powerpoint/2010/main" val="2575302751"/>
+        <p14:creationId xmlns:p14="http://schemas.microsoft.com/office/powerpoint/2010/main" val="4222326381"/>
       </p:ext>
     </p:extLst>
   </p:cSld>
@@ -13480,6 +13504,42 @@
           </a:p>
         </p:txBody>
       </p:sp>
+      <p:pic>
+        <p:nvPicPr>
+          <p:cNvPr id="7" name="Picture 6">
+            <a:extLst>
+              <a:ext uri="{FF2B5EF4-FFF2-40B4-BE49-F238E27FC236}">
+                <a16:creationId xmlns:a16="http://schemas.microsoft.com/office/drawing/2014/main" id="{584980CB-67D0-4D34-8269-27F2B5D09433}"/>
+              </a:ext>
+            </a:extLst>
+          </p:cNvPr>
+          <p:cNvPicPr>
+            <a:picLocks noChangeAspect="1"/>
+          </p:cNvPicPr>
+          <p:nvPr/>
+        </p:nvPicPr>
+        <p:blipFill>
+          <a:blip r:embed="rId3">
+            <a:extLst>
+              <a:ext uri="{28A0092B-C50C-407E-A947-70E740481C1C}">
+                <a14:useLocalDpi xmlns:a14="http://schemas.microsoft.com/office/drawing/2010/main" val="0"/>
+              </a:ext>
+            </a:extLst>
+          </a:blip>
+          <a:stretch>
+            <a:fillRect/>
+          </a:stretch>
+        </p:blipFill>
+        <p:spPr>
+          <a:xfrm>
+            <a:off x="1981200" y="2743199"/>
+            <a:ext cx="7924800" cy="3645083"/>
+          </a:xfrm>
+          <a:prstGeom prst="rect">
+            <a:avLst/>
+          </a:prstGeom>
+        </p:spPr>
+      </p:pic>
     </p:spTree>
     <p:extLst>
       <p:ext uri="{BB962C8B-B14F-4D97-AF65-F5344CB8AC3E}">
@@ -14034,15 +14094,87 @@
           <a:p>
             <a:r>
               <a:rPr lang="en-US" dirty="0"/>
-              <a:t>Reading</a:t>
-            </a:r>
-          </a:p>
-        </p:txBody>
-      </p:sp>
+              <a:t>Control</a:t>
+            </a:r>
+          </a:p>
+        </p:txBody>
+      </p:sp>
+      <p:pic>
+        <p:nvPicPr>
+          <p:cNvPr id="5" name="Picture 4">
+            <a:extLst>
+              <a:ext uri="{FF2B5EF4-FFF2-40B4-BE49-F238E27FC236}">
+                <a16:creationId xmlns:a16="http://schemas.microsoft.com/office/drawing/2014/main" id="{536F2338-083D-4FE2-8A4E-5DBAC59A2E8E}"/>
+              </a:ext>
+            </a:extLst>
+          </p:cNvPr>
+          <p:cNvPicPr>
+            <a:picLocks noChangeAspect="1"/>
+          </p:cNvPicPr>
+          <p:nvPr/>
+        </p:nvPicPr>
+        <p:blipFill>
+          <a:blip r:embed="rId3">
+            <a:extLst>
+              <a:ext uri="{28A0092B-C50C-407E-A947-70E740481C1C}">
+                <a14:useLocalDpi xmlns:a14="http://schemas.microsoft.com/office/drawing/2010/main" val="0"/>
+              </a:ext>
+            </a:extLst>
+          </a:blip>
+          <a:stretch>
+            <a:fillRect/>
+          </a:stretch>
+        </p:blipFill>
+        <p:spPr>
+          <a:xfrm>
+            <a:off x="381000" y="2514600"/>
+            <a:ext cx="6121617" cy="3794127"/>
+          </a:xfrm>
+          <a:prstGeom prst="rect">
+            <a:avLst/>
+          </a:prstGeom>
+        </p:spPr>
+      </p:pic>
+      <p:pic>
+        <p:nvPicPr>
+          <p:cNvPr id="7" name="Picture 6">
+            <a:extLst>
+              <a:ext uri="{FF2B5EF4-FFF2-40B4-BE49-F238E27FC236}">
+                <a16:creationId xmlns:a16="http://schemas.microsoft.com/office/drawing/2014/main" id="{2DD2A0DE-5F08-4E04-BA4F-954E1DB6ADCE}"/>
+              </a:ext>
+            </a:extLst>
+          </p:cNvPr>
+          <p:cNvPicPr>
+            <a:picLocks noChangeAspect="1"/>
+          </p:cNvPicPr>
+          <p:nvPr/>
+        </p:nvPicPr>
+        <p:blipFill>
+          <a:blip r:embed="rId4">
+            <a:extLst>
+              <a:ext uri="{28A0092B-C50C-407E-A947-70E740481C1C}">
+                <a14:useLocalDpi xmlns:a14="http://schemas.microsoft.com/office/drawing/2010/main" val="0"/>
+              </a:ext>
+            </a:extLst>
+          </a:blip>
+          <a:stretch>
+            <a:fillRect/>
+          </a:stretch>
+        </p:blipFill>
+        <p:spPr>
+          <a:xfrm>
+            <a:off x="6731216" y="1219200"/>
+            <a:ext cx="5232183" cy="3026757"/>
+          </a:xfrm>
+          <a:prstGeom prst="rect">
+            <a:avLst/>
+          </a:prstGeom>
+        </p:spPr>
+      </p:pic>
     </p:spTree>
     <p:extLst>
       <p:ext uri="{BB962C8B-B14F-4D97-AF65-F5344CB8AC3E}">
-        <p14:creationId xmlns:p14="http://schemas.microsoft.com/office/powerpoint/2010/main" val="1985340125"/>
+        <p14:creationId xmlns:p14="http://schemas.microsoft.com/office/powerpoint/2010/main" val="1439147467"/>
       </p:ext>
     </p:extLst>
   </p:cSld>
@@ -14086,7 +14218,7 @@
           <p:cNvPr id="2" name="Title 1">
             <a:extLst>
               <a:ext uri="{FF2B5EF4-FFF2-40B4-BE49-F238E27FC236}">
-                <a16:creationId xmlns:a16="http://schemas.microsoft.com/office/drawing/2014/main" id="{763FABF5-3C1B-48EB-8C55-20683ABC5C49}"/>
+                <a16:creationId xmlns:a16="http://schemas.microsoft.com/office/drawing/2014/main" id="{96688FE7-FCD2-4E31-8DB9-55091B637F52}"/>
               </a:ext>
             </a:extLst>
           </p:cNvPr>
@@ -14104,7 +14236,7 @@
           <a:p>
             <a:r>
               <a:rPr lang="en-US" dirty="0"/>
-              <a:t>Sensors - Gyro</a:t>
+              <a:t>Sensors - Other</a:t>
             </a:r>
           </a:p>
         </p:txBody>
@@ -14114,7 +14246,7 @@
           <p:cNvPr id="3" name="Content Placeholder 2">
             <a:extLst>
               <a:ext uri="{FF2B5EF4-FFF2-40B4-BE49-F238E27FC236}">
-                <a16:creationId xmlns:a16="http://schemas.microsoft.com/office/drawing/2014/main" id="{887996E5-7553-45D3-9F73-2B374ED14CDD}"/>
+                <a16:creationId xmlns:a16="http://schemas.microsoft.com/office/drawing/2014/main" id="{C2A73323-B69E-4771-9374-CCC472D8B78F}"/>
               </a:ext>
             </a:extLst>
           </p:cNvPr>
@@ -14131,16 +14263,29 @@
           <a:lstStyle/>
           <a:p>
             <a:r>
-              <a:rPr lang="en-US" dirty="0"/>
-              <a:t>Control</a:t>
-            </a:r>
+              <a:rPr lang="en-US" dirty="0">
+                <a:highlight>
+                  <a:srgbClr val="00FFFF"/>
+                </a:highlight>
+                <a:hlinkClick r:id="rId2"/>
+              </a:rPr>
+              <a:t>https://www.frclabviewtutorials.com/tutorials/sensors/dashboard/arduino/</a:t>
+            </a:r>
+            <a:endParaRPr lang="en-US" dirty="0">
+              <a:highlight>
+                <a:srgbClr val="00FFFF"/>
+              </a:highlight>
+            </a:endParaRPr>
+          </a:p>
+          <a:p>
+            <a:endParaRPr lang="en-US" dirty="0"/>
           </a:p>
         </p:txBody>
       </p:sp>
     </p:spTree>
     <p:extLst>
       <p:ext uri="{BB962C8B-B14F-4D97-AF65-F5344CB8AC3E}">
-        <p14:creationId xmlns:p14="http://schemas.microsoft.com/office/powerpoint/2010/main" val="1439147467"/>
+        <p14:creationId xmlns:p14="http://schemas.microsoft.com/office/powerpoint/2010/main" val="1058733803"/>
       </p:ext>
     </p:extLst>
   </p:cSld>
@@ -14184,117 +14329,6 @@
           <p:cNvPr id="2" name="Title 1">
             <a:extLst>
               <a:ext uri="{FF2B5EF4-FFF2-40B4-BE49-F238E27FC236}">
-                <a16:creationId xmlns:a16="http://schemas.microsoft.com/office/drawing/2014/main" id="{96688FE7-FCD2-4E31-8DB9-55091B637F52}"/>
-              </a:ext>
-            </a:extLst>
-          </p:cNvPr>
-          <p:cNvSpPr>
-            <a:spLocks noGrp="1"/>
-          </p:cNvSpPr>
-          <p:nvPr>
-            <p:ph type="title"/>
-          </p:nvPr>
-        </p:nvSpPr>
-        <p:spPr/>
-        <p:txBody>
-          <a:bodyPr/>
-          <a:lstStyle/>
-          <a:p>
-            <a:r>
-              <a:rPr lang="en-US" dirty="0"/>
-              <a:t>Sensors - Other</a:t>
-            </a:r>
-          </a:p>
-        </p:txBody>
-      </p:sp>
-      <p:sp>
-        <p:nvSpPr>
-          <p:cNvPr id="3" name="Content Placeholder 2">
-            <a:extLst>
-              <a:ext uri="{FF2B5EF4-FFF2-40B4-BE49-F238E27FC236}">
-                <a16:creationId xmlns:a16="http://schemas.microsoft.com/office/drawing/2014/main" id="{C2A73323-B69E-4771-9374-CCC472D8B78F}"/>
-              </a:ext>
-            </a:extLst>
-          </p:cNvPr>
-          <p:cNvSpPr>
-            <a:spLocks noGrp="1"/>
-          </p:cNvSpPr>
-          <p:nvPr>
-            <p:ph idx="1"/>
-          </p:nvPr>
-        </p:nvSpPr>
-        <p:spPr/>
-        <p:txBody>
-          <a:bodyPr/>
-          <a:lstStyle/>
-          <a:p>
-            <a:r>
-              <a:rPr lang="en-US" dirty="0">
-                <a:highlight>
-                  <a:srgbClr val="00FFFF"/>
-                </a:highlight>
-                <a:hlinkClick r:id="rId2"/>
-              </a:rPr>
-              <a:t>https://www.frclabviewtutorials.com/tutorials/sensors/dashboard/arduino/</a:t>
-            </a:r>
-            <a:endParaRPr lang="en-US" dirty="0">
-              <a:highlight>
-                <a:srgbClr val="00FFFF"/>
-              </a:highlight>
-            </a:endParaRPr>
-          </a:p>
-          <a:p>
-            <a:endParaRPr lang="en-US" dirty="0"/>
-          </a:p>
-        </p:txBody>
-      </p:sp>
-    </p:spTree>
-    <p:extLst>
-      <p:ext uri="{BB962C8B-B14F-4D97-AF65-F5344CB8AC3E}">
-        <p14:creationId xmlns:p14="http://schemas.microsoft.com/office/powerpoint/2010/main" val="1058733803"/>
-      </p:ext>
-    </p:extLst>
-  </p:cSld>
-  <p:clrMapOvr>
-    <a:masterClrMapping/>
-  </p:clrMapOvr>
-  <mc:AlternateContent xmlns:mc="http://schemas.openxmlformats.org/markup-compatibility/2006" xmlns:p14="http://schemas.microsoft.com/office/powerpoint/2010/main">
-    <mc:Choice Requires="p14">
-      <p:transition spd="med" p14:dur="700">
-        <p:fade/>
-      </p:transition>
-    </mc:Choice>
-    <mc:Fallback xmlns="">
-      <p:transition spd="med">
-        <p:fade/>
-      </p:transition>
-    </mc:Fallback>
-  </mc:AlternateContent>
-</p:sld>
-</file>
-
-<file path=ppt/slides/slide44.xml><?xml version="1.0" encoding="utf-8"?>
-<p:sld xmlns:a="http://schemas.openxmlformats.org/drawingml/2006/main" xmlns:r="http://schemas.openxmlformats.org/officeDocument/2006/relationships" xmlns:p="http://schemas.openxmlformats.org/presentationml/2006/main">
-  <p:cSld>
-    <p:spTree>
-      <p:nvGrpSpPr>
-        <p:cNvPr id="1" name=""/>
-        <p:cNvGrpSpPr/>
-        <p:nvPr/>
-      </p:nvGrpSpPr>
-      <p:grpSpPr>
-        <a:xfrm>
-          <a:off x="0" y="0"/>
-          <a:ext cx="0" cy="0"/>
-          <a:chOff x="0" y="0"/>
-          <a:chExt cx="0" cy="0"/>
-        </a:xfrm>
-      </p:grpSpPr>
-      <p:sp>
-        <p:nvSpPr>
-          <p:cNvPr id="2" name="Title 1">
-            <a:extLst>
-              <a:ext uri="{FF2B5EF4-FFF2-40B4-BE49-F238E27FC236}">
                 <a16:creationId xmlns:a16="http://schemas.microsoft.com/office/drawing/2014/main" id="{E8496CBC-7E67-4B1D-BECB-07961FC9FE41}"/>
               </a:ext>
             </a:extLst>
@@ -14368,7 +14402,7 @@
 </p:sld>
 </file>
 
-<file path=ppt/slides/slide45.xml><?xml version="1.0" encoding="utf-8"?>
+<file path=ppt/slides/slide44.xml><?xml version="1.0" encoding="utf-8"?>
 <p:sld xmlns:a="http://schemas.openxmlformats.org/drawingml/2006/main" xmlns:r="http://schemas.openxmlformats.org/officeDocument/2006/relationships" xmlns:p="http://schemas.openxmlformats.org/presentationml/2006/main">
   <p:cSld>
     <p:spTree>

</xml_diff>

<commit_message>
fix note on potentiometer vs number of rotations.
</commit_message>
<xml_diff>
--- a/files/2019/LabVIEW_Advanced.pptx
+++ b/files/2019/LabVIEW_Advanced.pptx
@@ -251,7 +251,7 @@
           <a:p>
             <a:fld id="{93091DA9-5012-40B4-BF7C-936F20E7C29F}" type="datetimeFigureOut">
               <a:rPr lang="en-US" smtClean="0"/>
-              <a:t>12/29/2018</a:t>
+              <a:t>1/1/2019</a:t>
             </a:fld>
             <a:endParaRPr lang="en-US"/>
           </a:p>
@@ -4992,7 +4992,7 @@
           <a:p>
             <a:fld id="{08007FA6-D051-4DA4-98CE-CD48777DE9E5}" type="datetimeFigureOut">
               <a:rPr lang="en-US" smtClean="0"/>
-              <a:t>12/29/2018</a:t>
+              <a:t>1/1/2019</a:t>
             </a:fld>
             <a:endParaRPr lang="en-US"/>
           </a:p>
@@ -5172,7 +5172,7 @@
           <a:p>
             <a:fld id="{08007FA6-D051-4DA4-98CE-CD48777DE9E5}" type="datetimeFigureOut">
               <a:rPr lang="en-US" smtClean="0"/>
-              <a:t>12/29/2018</a:t>
+              <a:t>1/1/2019</a:t>
             </a:fld>
             <a:endParaRPr lang="en-US"/>
           </a:p>
@@ -5362,7 +5362,7 @@
           <a:p>
             <a:fld id="{08007FA6-D051-4DA4-98CE-CD48777DE9E5}" type="datetimeFigureOut">
               <a:rPr lang="en-US" smtClean="0"/>
-              <a:t>12/29/2018</a:t>
+              <a:t>1/1/2019</a:t>
             </a:fld>
             <a:endParaRPr lang="en-US"/>
           </a:p>
@@ -5542,7 +5542,7 @@
           <a:p>
             <a:fld id="{08007FA6-D051-4DA4-98CE-CD48777DE9E5}" type="datetimeFigureOut">
               <a:rPr lang="en-US" smtClean="0"/>
-              <a:t>12/29/2018</a:t>
+              <a:t>1/1/2019</a:t>
             </a:fld>
             <a:endParaRPr lang="en-US"/>
           </a:p>
@@ -5799,7 +5799,7 @@
           <a:p>
             <a:fld id="{08007FA6-D051-4DA4-98CE-CD48777DE9E5}" type="datetimeFigureOut">
               <a:rPr lang="en-US" smtClean="0"/>
-              <a:t>12/29/2018</a:t>
+              <a:t>1/1/2019</a:t>
             </a:fld>
             <a:endParaRPr lang="en-US"/>
           </a:p>
@@ -6096,7 +6096,7 @@
           <a:p>
             <a:fld id="{08007FA6-D051-4DA4-98CE-CD48777DE9E5}" type="datetimeFigureOut">
               <a:rPr lang="en-US" smtClean="0"/>
-              <a:t>12/29/2018</a:t>
+              <a:t>1/1/2019</a:t>
             </a:fld>
             <a:endParaRPr lang="en-US"/>
           </a:p>
@@ -6527,7 +6527,7 @@
           <a:p>
             <a:fld id="{08007FA6-D051-4DA4-98CE-CD48777DE9E5}" type="datetimeFigureOut">
               <a:rPr lang="en-US" smtClean="0"/>
-              <a:t>12/29/2018</a:t>
+              <a:t>1/1/2019</a:t>
             </a:fld>
             <a:endParaRPr lang="en-US"/>
           </a:p>
@@ -6656,7 +6656,7 @@
           <a:p>
             <a:fld id="{08007FA6-D051-4DA4-98CE-CD48777DE9E5}" type="datetimeFigureOut">
               <a:rPr lang="en-US" smtClean="0"/>
-              <a:t>12/29/2018</a:t>
+              <a:t>1/1/2019</a:t>
             </a:fld>
             <a:endParaRPr lang="en-US"/>
           </a:p>
@@ -6763,7 +6763,7 @@
           <a:p>
             <a:fld id="{08007FA6-D051-4DA4-98CE-CD48777DE9E5}" type="datetimeFigureOut">
               <a:rPr lang="en-US" smtClean="0"/>
-              <a:t>12/29/2018</a:t>
+              <a:t>1/1/2019</a:t>
             </a:fld>
             <a:endParaRPr lang="en-US"/>
           </a:p>
@@ -7050,7 +7050,7 @@
           <a:p>
             <a:fld id="{08007FA6-D051-4DA4-98CE-CD48777DE9E5}" type="datetimeFigureOut">
               <a:rPr lang="en-US" smtClean="0"/>
-              <a:t>12/29/2018</a:t>
+              <a:t>1/1/2019</a:t>
             </a:fld>
             <a:endParaRPr lang="en-US"/>
           </a:p>
@@ -7314,7 +7314,7 @@
           <a:p>
             <a:fld id="{08007FA6-D051-4DA4-98CE-CD48777DE9E5}" type="datetimeFigureOut">
               <a:rPr lang="en-US" smtClean="0"/>
-              <a:t>12/29/2018</a:t>
+              <a:t>1/1/2019</a:t>
             </a:fld>
             <a:endParaRPr lang="en-US"/>
           </a:p>
@@ -7537,7 +7537,7 @@
           <a:p>
             <a:fld id="{08007FA6-D051-4DA4-98CE-CD48777DE9E5}" type="datetimeFigureOut">
               <a:rPr lang="en-US" smtClean="0"/>
-              <a:t>12/29/2018</a:t>
+              <a:t>1/1/2019</a:t>
             </a:fld>
             <a:endParaRPr lang="en-US"/>
           </a:p>
@@ -13371,7 +13371,7 @@
             <a:pPr lvl="1"/>
             <a:r>
               <a:rPr lang="en-US" dirty="0"/>
-              <a:t>Trying to measure rotational distances possibly greater than 8 rotations.</a:t>
+              <a:t>Trying to measure rotational distances less than 8 rotations.</a:t>
             </a:r>
           </a:p>
           <a:p>

</xml_diff>

<commit_message>
update kick off day 2019
</commit_message>
<xml_diff>
--- a/files/2019/LabVIEW_Advanced.pptx
+++ b/files/2019/LabVIEW_Advanced.pptx
@@ -5,7 +5,7 @@
     <p:sldMasterId id="2147483648" r:id="rId1"/>
   </p:sldMasterIdLst>
   <p:notesMasterIdLst>
-    <p:notesMasterId r:id="rId46"/>
+    <p:notesMasterId r:id="rId47"/>
   </p:notesMasterIdLst>
   <p:sldIdLst>
     <p:sldId id="256" r:id="rId2"/>
@@ -49,9 +49,10 @@
     <p:sldId id="391" r:id="rId40"/>
     <p:sldId id="392" r:id="rId41"/>
     <p:sldId id="394" r:id="rId42"/>
-    <p:sldId id="396" r:id="rId43"/>
-    <p:sldId id="395" r:id="rId44"/>
-    <p:sldId id="275" r:id="rId45"/>
+    <p:sldId id="398" r:id="rId43"/>
+    <p:sldId id="396" r:id="rId44"/>
+    <p:sldId id="395" r:id="rId45"/>
+    <p:sldId id="275" r:id="rId46"/>
   </p:sldIdLst>
   <p:sldSz cx="12192000" cy="6858000"/>
   <p:notesSz cx="6858000" cy="9144000"/>
@@ -251,7 +252,7 @@
           <a:p>
             <a:fld id="{93091DA9-5012-40B4-BF7C-936F20E7C29F}" type="datetimeFigureOut">
               <a:rPr lang="en-US" smtClean="0"/>
-              <a:t>1/1/2019</a:t>
+              <a:t>1/4/2019</a:t>
             </a:fld>
             <a:endParaRPr lang="en-US"/>
           </a:p>
@@ -4142,6 +4143,24 @@
           <a:bodyPr/>
           <a:lstStyle/>
           <a:p>
+            <a:r>
+              <a:rPr lang="en-US" dirty="0"/>
+              <a:t>DistanceToTarget2.vi</a:t>
+            </a:r>
+          </a:p>
+          <a:p>
+            <a:endParaRPr lang="en-US" dirty="0"/>
+          </a:p>
+          <a:p>
+            <a:r>
+              <a:rPr lang="en-US" dirty="0"/>
+              <a:t>Desktop Example</a:t>
+            </a:r>
+          </a:p>
+          <a:p>
+            <a:endParaRPr lang="en-US" dirty="0"/>
+          </a:p>
+          <a:p>
             <a:endParaRPr lang="en-US" dirty="0"/>
           </a:p>
         </p:txBody>
@@ -4163,7 +4182,91 @@
           <a:p>
             <a:fld id="{7869CEDA-A88F-405F-B085-0C49B47076E2}" type="slidenum">
               <a:rPr lang="en-US" smtClean="0"/>
-              <a:t>43</a:t>
+              <a:t>42</a:t>
+            </a:fld>
+            <a:endParaRPr lang="en-US"/>
+          </a:p>
+        </p:txBody>
+      </p:sp>
+    </p:spTree>
+    <p:extLst>
+      <p:ext uri="{BB962C8B-B14F-4D97-AF65-F5344CB8AC3E}">
+        <p14:creationId xmlns:p14="http://schemas.microsoft.com/office/powerpoint/2010/main" val="1313100137"/>
+      </p:ext>
+    </p:extLst>
+  </p:cSld>
+  <p:clrMapOvr>
+    <a:masterClrMapping/>
+  </p:clrMapOvr>
+</p:notes>
+</file>
+
+<file path=ppt/notesSlides/notesSlide41.xml><?xml version="1.0" encoding="utf-8"?>
+<p:notes xmlns:a="http://schemas.openxmlformats.org/drawingml/2006/main" xmlns:r="http://schemas.openxmlformats.org/officeDocument/2006/relationships" xmlns:p="http://schemas.openxmlformats.org/presentationml/2006/main">
+  <p:cSld>
+    <p:spTree>
+      <p:nvGrpSpPr>
+        <p:cNvPr id="1" name=""/>
+        <p:cNvGrpSpPr/>
+        <p:nvPr/>
+      </p:nvGrpSpPr>
+      <p:grpSpPr>
+        <a:xfrm>
+          <a:off x="0" y="0"/>
+          <a:ext cx="0" cy="0"/>
+          <a:chOff x="0" y="0"/>
+          <a:chExt cx="0" cy="0"/>
+        </a:xfrm>
+      </p:grpSpPr>
+      <p:sp>
+        <p:nvSpPr>
+          <p:cNvPr id="2" name="Slide Image Placeholder 1"/>
+          <p:cNvSpPr>
+            <a:spLocks noGrp="1" noRot="1" noChangeAspect="1"/>
+          </p:cNvSpPr>
+          <p:nvPr>
+            <p:ph type="sldImg"/>
+          </p:nvPr>
+        </p:nvSpPr>
+        <p:spPr/>
+      </p:sp>
+      <p:sp>
+        <p:nvSpPr>
+          <p:cNvPr id="3" name="Notes Placeholder 2"/>
+          <p:cNvSpPr>
+            <a:spLocks noGrp="1"/>
+          </p:cNvSpPr>
+          <p:nvPr>
+            <p:ph type="body" idx="1"/>
+          </p:nvPr>
+        </p:nvSpPr>
+        <p:spPr/>
+        <p:txBody>
+          <a:bodyPr/>
+          <a:lstStyle/>
+          <a:p>
+            <a:endParaRPr lang="en-US" dirty="0"/>
+          </a:p>
+        </p:txBody>
+      </p:sp>
+      <p:sp>
+        <p:nvSpPr>
+          <p:cNvPr id="4" name="Slide Number Placeholder 3"/>
+          <p:cNvSpPr>
+            <a:spLocks noGrp="1"/>
+          </p:cNvSpPr>
+          <p:nvPr>
+            <p:ph type="sldNum" sz="quarter" idx="5"/>
+          </p:nvPr>
+        </p:nvSpPr>
+        <p:spPr/>
+        <p:txBody>
+          <a:bodyPr/>
+          <a:lstStyle/>
+          <a:p>
+            <a:fld id="{7869CEDA-A88F-405F-B085-0C49B47076E2}" type="slidenum">
+              <a:rPr lang="en-US" smtClean="0"/>
+              <a:t>44</a:t>
             </a:fld>
             <a:endParaRPr lang="en-US"/>
           </a:p>
@@ -4992,7 +5095,7 @@
           <a:p>
             <a:fld id="{08007FA6-D051-4DA4-98CE-CD48777DE9E5}" type="datetimeFigureOut">
               <a:rPr lang="en-US" smtClean="0"/>
-              <a:t>1/1/2019</a:t>
+              <a:t>1/4/2019</a:t>
             </a:fld>
             <a:endParaRPr lang="en-US"/>
           </a:p>
@@ -5172,7 +5275,7 @@
           <a:p>
             <a:fld id="{08007FA6-D051-4DA4-98CE-CD48777DE9E5}" type="datetimeFigureOut">
               <a:rPr lang="en-US" smtClean="0"/>
-              <a:t>1/1/2019</a:t>
+              <a:t>1/4/2019</a:t>
             </a:fld>
             <a:endParaRPr lang="en-US"/>
           </a:p>
@@ -5362,7 +5465,7 @@
           <a:p>
             <a:fld id="{08007FA6-D051-4DA4-98CE-CD48777DE9E5}" type="datetimeFigureOut">
               <a:rPr lang="en-US" smtClean="0"/>
-              <a:t>1/1/2019</a:t>
+              <a:t>1/4/2019</a:t>
             </a:fld>
             <a:endParaRPr lang="en-US"/>
           </a:p>
@@ -5542,7 +5645,7 @@
           <a:p>
             <a:fld id="{08007FA6-D051-4DA4-98CE-CD48777DE9E5}" type="datetimeFigureOut">
               <a:rPr lang="en-US" smtClean="0"/>
-              <a:t>1/1/2019</a:t>
+              <a:t>1/4/2019</a:t>
             </a:fld>
             <a:endParaRPr lang="en-US"/>
           </a:p>
@@ -5799,7 +5902,7 @@
           <a:p>
             <a:fld id="{08007FA6-D051-4DA4-98CE-CD48777DE9E5}" type="datetimeFigureOut">
               <a:rPr lang="en-US" smtClean="0"/>
-              <a:t>1/1/2019</a:t>
+              <a:t>1/4/2019</a:t>
             </a:fld>
             <a:endParaRPr lang="en-US"/>
           </a:p>
@@ -6096,7 +6199,7 @@
           <a:p>
             <a:fld id="{08007FA6-D051-4DA4-98CE-CD48777DE9E5}" type="datetimeFigureOut">
               <a:rPr lang="en-US" smtClean="0"/>
-              <a:t>1/1/2019</a:t>
+              <a:t>1/4/2019</a:t>
             </a:fld>
             <a:endParaRPr lang="en-US"/>
           </a:p>
@@ -6527,7 +6630,7 @@
           <a:p>
             <a:fld id="{08007FA6-D051-4DA4-98CE-CD48777DE9E5}" type="datetimeFigureOut">
               <a:rPr lang="en-US" smtClean="0"/>
-              <a:t>1/1/2019</a:t>
+              <a:t>1/4/2019</a:t>
             </a:fld>
             <a:endParaRPr lang="en-US"/>
           </a:p>
@@ -6656,7 +6759,7 @@
           <a:p>
             <a:fld id="{08007FA6-D051-4DA4-98CE-CD48777DE9E5}" type="datetimeFigureOut">
               <a:rPr lang="en-US" smtClean="0"/>
-              <a:t>1/1/2019</a:t>
+              <a:t>1/4/2019</a:t>
             </a:fld>
             <a:endParaRPr lang="en-US"/>
           </a:p>
@@ -6763,7 +6866,7 @@
           <a:p>
             <a:fld id="{08007FA6-D051-4DA4-98CE-CD48777DE9E5}" type="datetimeFigureOut">
               <a:rPr lang="en-US" smtClean="0"/>
-              <a:t>1/1/2019</a:t>
+              <a:t>1/4/2019</a:t>
             </a:fld>
             <a:endParaRPr lang="en-US"/>
           </a:p>
@@ -7050,7 +7153,7 @@
           <a:p>
             <a:fld id="{08007FA6-D051-4DA4-98CE-CD48777DE9E5}" type="datetimeFigureOut">
               <a:rPr lang="en-US" smtClean="0"/>
-              <a:t>1/1/2019</a:t>
+              <a:t>1/4/2019</a:t>
             </a:fld>
             <a:endParaRPr lang="en-US"/>
           </a:p>
@@ -7314,7 +7417,7 @@
           <a:p>
             <a:fld id="{08007FA6-D051-4DA4-98CE-CD48777DE9E5}" type="datetimeFigureOut">
               <a:rPr lang="en-US" smtClean="0"/>
-              <a:t>1/1/2019</a:t>
+              <a:t>1/4/2019</a:t>
             </a:fld>
             <a:endParaRPr lang="en-US"/>
           </a:p>
@@ -7537,7 +7640,7 @@
           <a:p>
             <a:fld id="{08007FA6-D051-4DA4-98CE-CD48777DE9E5}" type="datetimeFigureOut">
               <a:rPr lang="en-US" smtClean="0"/>
-              <a:t>1/1/2019</a:t>
+              <a:t>1/4/2019</a:t>
             </a:fld>
             <a:endParaRPr lang="en-US"/>
           </a:p>
@@ -13808,7 +13911,7 @@
 </file>
 
 <file path=ppt/slides/slide4.xml><?xml version="1.0" encoding="utf-8"?>
-<p:sld xmlns:a="http://schemas.openxmlformats.org/drawingml/2006/main" xmlns:r="http://schemas.openxmlformats.org/officeDocument/2006/relationships" xmlns:p="http://schemas.openxmlformats.org/presentationml/2006/main">
+<p:sld xmlns:a="http://schemas.openxmlformats.org/drawingml/2006/main" xmlns:r="http://schemas.openxmlformats.org/officeDocument/2006/relationships" xmlns:p="http://schemas.openxmlformats.org/presentationml/2006/main" show="0">
   <p:cSld>
     <p:spTree>
       <p:nvGrpSpPr>
@@ -13890,13 +13993,13 @@
   <p:clrMapOvr>
     <a:masterClrMapping/>
   </p:clrMapOvr>
-  <mc:AlternateContent xmlns:mc="http://schemas.openxmlformats.org/markup-compatibility/2006" xmlns:p14="http://schemas.microsoft.com/office/powerpoint/2010/main">
-    <mc:Choice Requires="p14">
+  <mc:AlternateContent xmlns:mc="http://schemas.openxmlformats.org/markup-compatibility/2006">
+    <mc:Choice xmlns:p14="http://schemas.microsoft.com/office/powerpoint/2010/main" Requires="p14">
       <p:transition spd="med" p14:dur="700">
         <p:fade/>
       </p:transition>
     </mc:Choice>
-    <mc:Fallback xmlns="">
+    <mc:Fallback>
       <p:transition spd="med">
         <p:fade/>
       </p:transition>
@@ -14218,7 +14321,7 @@
           <p:cNvPr id="2" name="Title 1">
             <a:extLst>
               <a:ext uri="{FF2B5EF4-FFF2-40B4-BE49-F238E27FC236}">
-                <a16:creationId xmlns:a16="http://schemas.microsoft.com/office/drawing/2014/main" id="{96688FE7-FCD2-4E31-8DB9-55091B637F52}"/>
+                <a16:creationId xmlns:a16="http://schemas.microsoft.com/office/drawing/2014/main" id="{763FABF5-3C1B-48EB-8C55-20683ABC5C49}"/>
               </a:ext>
             </a:extLst>
           </p:cNvPr>
@@ -14236,7 +14339,7 @@
           <a:p>
             <a:r>
               <a:rPr lang="en-US" dirty="0"/>
-              <a:t>Sensors - Other</a:t>
+              <a:t>Sensors - Vision</a:t>
             </a:r>
           </a:p>
         </p:txBody>
@@ -14246,7 +14349,7 @@
           <p:cNvPr id="3" name="Content Placeholder 2">
             <a:extLst>
               <a:ext uri="{FF2B5EF4-FFF2-40B4-BE49-F238E27FC236}">
-                <a16:creationId xmlns:a16="http://schemas.microsoft.com/office/drawing/2014/main" id="{C2A73323-B69E-4771-9374-CCC472D8B78F}"/>
+                <a16:creationId xmlns:a16="http://schemas.microsoft.com/office/drawing/2014/main" id="{887996E5-7553-45D3-9F73-2B374ED14CDD}"/>
               </a:ext>
             </a:extLst>
           </p:cNvPr>
@@ -14263,29 +14366,16 @@
           <a:lstStyle/>
           <a:p>
             <a:r>
-              <a:rPr lang="en-US" dirty="0">
-                <a:highlight>
-                  <a:srgbClr val="00FFFF"/>
-                </a:highlight>
-                <a:hlinkClick r:id="rId2"/>
-              </a:rPr>
-              <a:t>https://www.frclabviewtutorials.com/tutorials/sensors/dashboard/arduino/</a:t>
-            </a:r>
-            <a:endParaRPr lang="en-US" dirty="0">
-              <a:highlight>
-                <a:srgbClr val="00FFFF"/>
-              </a:highlight>
-            </a:endParaRPr>
-          </a:p>
-          <a:p>
-            <a:endParaRPr lang="en-US" dirty="0"/>
+              <a:rPr lang="en-US" dirty="0"/>
+              <a:t>Demo</a:t>
+            </a:r>
           </a:p>
         </p:txBody>
       </p:sp>
     </p:spTree>
     <p:extLst>
       <p:ext uri="{BB962C8B-B14F-4D97-AF65-F5344CB8AC3E}">
-        <p14:creationId xmlns:p14="http://schemas.microsoft.com/office/powerpoint/2010/main" val="1058733803"/>
+        <p14:creationId xmlns:p14="http://schemas.microsoft.com/office/powerpoint/2010/main" val="3570442853"/>
       </p:ext>
     </p:extLst>
   </p:cSld>
@@ -14329,7 +14419,7 @@
           <p:cNvPr id="2" name="Title 1">
             <a:extLst>
               <a:ext uri="{FF2B5EF4-FFF2-40B4-BE49-F238E27FC236}">
-                <a16:creationId xmlns:a16="http://schemas.microsoft.com/office/drawing/2014/main" id="{E8496CBC-7E67-4B1D-BECB-07961FC9FE41}"/>
+                <a16:creationId xmlns:a16="http://schemas.microsoft.com/office/drawing/2014/main" id="{96688FE7-FCD2-4E31-8DB9-55091B637F52}"/>
               </a:ext>
             </a:extLst>
           </p:cNvPr>
@@ -14347,7 +14437,7 @@
           <a:p>
             <a:r>
               <a:rPr lang="en-US" dirty="0"/>
-              <a:t>Demo</a:t>
+              <a:t>Sensors - Other</a:t>
             </a:r>
           </a:p>
         </p:txBody>
@@ -14357,7 +14447,7 @@
           <p:cNvPr id="3" name="Content Placeholder 2">
             <a:extLst>
               <a:ext uri="{FF2B5EF4-FFF2-40B4-BE49-F238E27FC236}">
-                <a16:creationId xmlns:a16="http://schemas.microsoft.com/office/drawing/2014/main" id="{51BB4105-FBC0-4811-83BF-D54C97BB5575}"/>
+                <a16:creationId xmlns:a16="http://schemas.microsoft.com/office/drawing/2014/main" id="{C2A73323-B69E-4771-9374-CCC472D8B78F}"/>
               </a:ext>
             </a:extLst>
           </p:cNvPr>
@@ -14373,14 +14463,30 @@
           <a:bodyPr/>
           <a:lstStyle/>
           <a:p>
-            <a:endParaRPr lang="en-US"/>
+            <a:r>
+              <a:rPr lang="en-US" dirty="0">
+                <a:highlight>
+                  <a:srgbClr val="00FFFF"/>
+                </a:highlight>
+                <a:hlinkClick r:id="rId2"/>
+              </a:rPr>
+              <a:t>https://www.frclabviewtutorials.com/tutorials/sensors/dashboard/arduino/</a:t>
+            </a:r>
+            <a:endParaRPr lang="en-US" dirty="0">
+              <a:highlight>
+                <a:srgbClr val="00FFFF"/>
+              </a:highlight>
+            </a:endParaRPr>
+          </a:p>
+          <a:p>
+            <a:endParaRPr lang="en-US" dirty="0"/>
           </a:p>
         </p:txBody>
       </p:sp>
     </p:spTree>
     <p:extLst>
       <p:ext uri="{BB962C8B-B14F-4D97-AF65-F5344CB8AC3E}">
-        <p14:creationId xmlns:p14="http://schemas.microsoft.com/office/powerpoint/2010/main" val="1753291323"/>
+        <p14:creationId xmlns:p14="http://schemas.microsoft.com/office/powerpoint/2010/main" val="1058733803"/>
       </p:ext>
     </p:extLst>
   </p:cSld>
@@ -14421,6 +14527,101 @@
       </p:grpSpPr>
       <p:sp>
         <p:nvSpPr>
+          <p:cNvPr id="2" name="Title 1">
+            <a:extLst>
+              <a:ext uri="{FF2B5EF4-FFF2-40B4-BE49-F238E27FC236}">
+                <a16:creationId xmlns:a16="http://schemas.microsoft.com/office/drawing/2014/main" id="{E8496CBC-7E67-4B1D-BECB-07961FC9FE41}"/>
+              </a:ext>
+            </a:extLst>
+          </p:cNvPr>
+          <p:cNvSpPr>
+            <a:spLocks noGrp="1"/>
+          </p:cNvSpPr>
+          <p:nvPr>
+            <p:ph type="title"/>
+          </p:nvPr>
+        </p:nvSpPr>
+        <p:spPr/>
+        <p:txBody>
+          <a:bodyPr/>
+          <a:lstStyle/>
+          <a:p>
+            <a:r>
+              <a:rPr lang="en-US" dirty="0"/>
+              <a:t>Demo</a:t>
+            </a:r>
+          </a:p>
+        </p:txBody>
+      </p:sp>
+      <p:sp>
+        <p:nvSpPr>
+          <p:cNvPr id="3" name="Content Placeholder 2">
+            <a:extLst>
+              <a:ext uri="{FF2B5EF4-FFF2-40B4-BE49-F238E27FC236}">
+                <a16:creationId xmlns:a16="http://schemas.microsoft.com/office/drawing/2014/main" id="{51BB4105-FBC0-4811-83BF-D54C97BB5575}"/>
+              </a:ext>
+            </a:extLst>
+          </p:cNvPr>
+          <p:cNvSpPr>
+            <a:spLocks noGrp="1"/>
+          </p:cNvSpPr>
+          <p:nvPr>
+            <p:ph idx="1"/>
+          </p:nvPr>
+        </p:nvSpPr>
+        <p:spPr/>
+        <p:txBody>
+          <a:bodyPr/>
+          <a:lstStyle/>
+          <a:p>
+            <a:endParaRPr lang="en-US"/>
+          </a:p>
+        </p:txBody>
+      </p:sp>
+    </p:spTree>
+    <p:extLst>
+      <p:ext uri="{BB962C8B-B14F-4D97-AF65-F5344CB8AC3E}">
+        <p14:creationId xmlns:p14="http://schemas.microsoft.com/office/powerpoint/2010/main" val="1753291323"/>
+      </p:ext>
+    </p:extLst>
+  </p:cSld>
+  <p:clrMapOvr>
+    <a:masterClrMapping/>
+  </p:clrMapOvr>
+  <mc:AlternateContent xmlns:mc="http://schemas.openxmlformats.org/markup-compatibility/2006" xmlns:p14="http://schemas.microsoft.com/office/powerpoint/2010/main">
+    <mc:Choice Requires="p14">
+      <p:transition spd="med" p14:dur="700">
+        <p:fade/>
+      </p:transition>
+    </mc:Choice>
+    <mc:Fallback xmlns="">
+      <p:transition spd="med">
+        <p:fade/>
+      </p:transition>
+    </mc:Fallback>
+  </mc:AlternateContent>
+</p:sld>
+</file>
+
+<file path=ppt/slides/slide45.xml><?xml version="1.0" encoding="utf-8"?>
+<p:sld xmlns:a="http://schemas.openxmlformats.org/drawingml/2006/main" xmlns:r="http://schemas.openxmlformats.org/officeDocument/2006/relationships" xmlns:p="http://schemas.openxmlformats.org/presentationml/2006/main">
+  <p:cSld>
+    <p:spTree>
+      <p:nvGrpSpPr>
+        <p:cNvPr id="1" name=""/>
+        <p:cNvGrpSpPr/>
+        <p:nvPr/>
+      </p:nvGrpSpPr>
+      <p:grpSpPr>
+        <a:xfrm>
+          <a:off x="0" y="0"/>
+          <a:ext cx="0" cy="0"/>
+          <a:chOff x="0" y="0"/>
+          <a:chExt cx="0" cy="0"/>
+        </a:xfrm>
+      </p:grpSpPr>
+      <p:sp>
+        <p:nvSpPr>
           <p:cNvPr id="2" name="Title 1"/>
           <p:cNvSpPr>
             <a:spLocks noGrp="1"/>
@@ -14486,7 +14687,7 @@
 </file>
 
 <file path=ppt/slides/slide5.xml><?xml version="1.0" encoding="utf-8"?>
-<p:sld xmlns:a="http://schemas.openxmlformats.org/drawingml/2006/main" xmlns:r="http://schemas.openxmlformats.org/officeDocument/2006/relationships" xmlns:p="http://schemas.openxmlformats.org/presentationml/2006/main">
+<p:sld xmlns:a="http://schemas.openxmlformats.org/drawingml/2006/main" xmlns:r="http://schemas.openxmlformats.org/officeDocument/2006/relationships" xmlns:p="http://schemas.openxmlformats.org/presentationml/2006/main" show="0">
   <p:cSld>
     <p:spTree>
       <p:nvGrpSpPr>
@@ -14589,13 +14790,13 @@
   <p:clrMapOvr>
     <a:masterClrMapping/>
   </p:clrMapOvr>
-  <mc:AlternateContent xmlns:mc="http://schemas.openxmlformats.org/markup-compatibility/2006" xmlns:p14="http://schemas.microsoft.com/office/powerpoint/2010/main">
-    <mc:Choice Requires="p14">
+  <mc:AlternateContent xmlns:mc="http://schemas.openxmlformats.org/markup-compatibility/2006">
+    <mc:Choice xmlns:p14="http://schemas.microsoft.com/office/powerpoint/2010/main" Requires="p14">
       <p:transition spd="med" p14:dur="700">
         <p:fade/>
       </p:transition>
     </mc:Choice>
-    <mc:Fallback xmlns="">
+    <mc:Fallback>
       <p:transition spd="med">
         <p:fade/>
       </p:transition>
@@ -14605,7 +14806,7 @@
 </file>
 
 <file path=ppt/slides/slide6.xml><?xml version="1.0" encoding="utf-8"?>
-<p:sld xmlns:a="http://schemas.openxmlformats.org/drawingml/2006/main" xmlns:r="http://schemas.openxmlformats.org/officeDocument/2006/relationships" xmlns:p="http://schemas.openxmlformats.org/presentationml/2006/main">
+<p:sld xmlns:a="http://schemas.openxmlformats.org/drawingml/2006/main" xmlns:r="http://schemas.openxmlformats.org/officeDocument/2006/relationships" xmlns:p="http://schemas.openxmlformats.org/presentationml/2006/main" show="0">
   <p:cSld>
     <p:spTree>
       <p:nvGrpSpPr>
@@ -14695,13 +14896,13 @@
   <p:clrMapOvr>
     <a:masterClrMapping/>
   </p:clrMapOvr>
-  <mc:AlternateContent xmlns:mc="http://schemas.openxmlformats.org/markup-compatibility/2006" xmlns:p14="http://schemas.microsoft.com/office/powerpoint/2010/main">
-    <mc:Choice Requires="p14">
+  <mc:AlternateContent xmlns:mc="http://schemas.openxmlformats.org/markup-compatibility/2006">
+    <mc:Choice xmlns:p14="http://schemas.microsoft.com/office/powerpoint/2010/main" Requires="p14">
       <p:transition spd="med" p14:dur="700">
         <p:fade/>
       </p:transition>
     </mc:Choice>
-    <mc:Fallback xmlns="">
+    <mc:Fallback>
       <p:transition spd="med">
         <p:fade/>
       </p:transition>
@@ -14711,7 +14912,7 @@
 </file>
 
 <file path=ppt/slides/slide7.xml><?xml version="1.0" encoding="utf-8"?>
-<p:sld xmlns:a="http://schemas.openxmlformats.org/drawingml/2006/main" xmlns:r="http://schemas.openxmlformats.org/officeDocument/2006/relationships" xmlns:p="http://schemas.openxmlformats.org/presentationml/2006/main">
+<p:sld xmlns:a="http://schemas.openxmlformats.org/drawingml/2006/main" xmlns:r="http://schemas.openxmlformats.org/officeDocument/2006/relationships" xmlns:p="http://schemas.openxmlformats.org/presentationml/2006/main" show="0">
   <p:cSld>
     <p:spTree>
       <p:nvGrpSpPr>
@@ -14828,13 +15029,13 @@
   <p:clrMapOvr>
     <a:masterClrMapping/>
   </p:clrMapOvr>
-  <mc:AlternateContent xmlns:mc="http://schemas.openxmlformats.org/markup-compatibility/2006" xmlns:p14="http://schemas.microsoft.com/office/powerpoint/2010/main">
-    <mc:Choice Requires="p14">
+  <mc:AlternateContent xmlns:mc="http://schemas.openxmlformats.org/markup-compatibility/2006">
+    <mc:Choice xmlns:p14="http://schemas.microsoft.com/office/powerpoint/2010/main" Requires="p14">
       <p:transition spd="med" p14:dur="700">
         <p:fade/>
       </p:transition>
     </mc:Choice>
-    <mc:Fallback xmlns="">
+    <mc:Fallback>
       <p:transition spd="med">
         <p:fade/>
       </p:transition>
@@ -14844,7 +15045,7 @@
 </file>
 
 <file path=ppt/slides/slide8.xml><?xml version="1.0" encoding="utf-8"?>
-<p:sld xmlns:a="http://schemas.openxmlformats.org/drawingml/2006/main" xmlns:r="http://schemas.openxmlformats.org/officeDocument/2006/relationships" xmlns:p="http://schemas.openxmlformats.org/presentationml/2006/main">
+<p:sld xmlns:a="http://schemas.openxmlformats.org/drawingml/2006/main" xmlns:r="http://schemas.openxmlformats.org/officeDocument/2006/relationships" xmlns:p="http://schemas.openxmlformats.org/presentationml/2006/main" show="0">
   <p:cSld>
     <p:spTree>
       <p:nvGrpSpPr>
@@ -14932,13 +15133,13 @@
   <p:clrMapOvr>
     <a:masterClrMapping/>
   </p:clrMapOvr>
-  <mc:AlternateContent xmlns:mc="http://schemas.openxmlformats.org/markup-compatibility/2006" xmlns:p14="http://schemas.microsoft.com/office/powerpoint/2010/main">
-    <mc:Choice Requires="p14">
+  <mc:AlternateContent xmlns:mc="http://schemas.openxmlformats.org/markup-compatibility/2006">
+    <mc:Choice xmlns:p14="http://schemas.microsoft.com/office/powerpoint/2010/main" Requires="p14">
       <p:transition spd="med" p14:dur="700">
         <p:fade/>
       </p:transition>
     </mc:Choice>
-    <mc:Fallback xmlns="">
+    <mc:Fallback>
       <p:transition spd="med">
         <p:fade/>
       </p:transition>
@@ -14948,7 +15149,7 @@
 </file>
 
 <file path=ppt/slides/slide9.xml><?xml version="1.0" encoding="utf-8"?>
-<p:sld xmlns:a="http://schemas.openxmlformats.org/drawingml/2006/main" xmlns:r="http://schemas.openxmlformats.org/officeDocument/2006/relationships" xmlns:p="http://schemas.openxmlformats.org/presentationml/2006/main">
+<p:sld xmlns:a="http://schemas.openxmlformats.org/drawingml/2006/main" xmlns:r="http://schemas.openxmlformats.org/officeDocument/2006/relationships" xmlns:p="http://schemas.openxmlformats.org/presentationml/2006/main" show="0">
   <p:cSld>
     <p:spTree>
       <p:nvGrpSpPr>
@@ -15054,13 +15255,13 @@
   <p:clrMapOvr>
     <a:masterClrMapping/>
   </p:clrMapOvr>
-  <mc:AlternateContent xmlns:mc="http://schemas.openxmlformats.org/markup-compatibility/2006" xmlns:p14="http://schemas.microsoft.com/office/powerpoint/2010/main">
-    <mc:Choice Requires="p14">
+  <mc:AlternateContent xmlns:mc="http://schemas.openxmlformats.org/markup-compatibility/2006">
+    <mc:Choice xmlns:p14="http://schemas.microsoft.com/office/powerpoint/2010/main" Requires="p14">
       <p:transition spd="med" p14:dur="700">
         <p:fade/>
       </p:transition>
     </mc:Choice>
-    <mc:Fallback xmlns="">
+    <mc:Fallback>
       <p:transition spd="med">
         <p:fade/>
       </p:transition>

</xml_diff>